<commit_message>
Added gitPrint to presentation
</commit_message>
<xml_diff>
--- a/Nonacat.pptx
+++ b/Nonacat.pptx
@@ -1,11 +1,11 @@
 
 <file path=ppt/presentation.xml><?xml version="1.0" encoding="utf-8"?>
-<p:presentation xmlns:a="http://schemas.openxmlformats.org/drawingml/2006/main" xmlns:r="http://schemas.openxmlformats.org/officeDocument/2006/relationships" xmlns:p="http://schemas.openxmlformats.org/presentationml/2006/main" saveSubsetFonts="1">
+<p:presentation xmlns:a="http://schemas.openxmlformats.org/drawingml/2006/main" xmlns:r="http://schemas.openxmlformats.org/officeDocument/2006/relationships" xmlns:p="http://schemas.openxmlformats.org/presentationml/2006/main" embedTrueTypeFonts="1">
   <p:sldMasterIdLst>
     <p:sldMasterId id="2147483648" r:id="rId1"/>
   </p:sldMasterIdLst>
   <p:notesMasterIdLst>
-    <p:notesMasterId r:id="rId30"/>
+    <p:notesMasterId r:id="rId31"/>
   </p:notesMasterIdLst>
   <p:sldIdLst>
     <p:sldId id="256" r:id="rId2"/>
@@ -20,25 +20,55 @@
     <p:sldId id="276" r:id="rId11"/>
     <p:sldId id="259" r:id="rId12"/>
     <p:sldId id="278" r:id="rId13"/>
-    <p:sldId id="279" r:id="rId14"/>
-    <p:sldId id="280" r:id="rId15"/>
-    <p:sldId id="260" r:id="rId16"/>
-    <p:sldId id="282" r:id="rId17"/>
-    <p:sldId id="284" r:id="rId18"/>
-    <p:sldId id="262" r:id="rId19"/>
-    <p:sldId id="293" r:id="rId20"/>
-    <p:sldId id="286" r:id="rId21"/>
-    <p:sldId id="263" r:id="rId22"/>
-    <p:sldId id="288" r:id="rId23"/>
-    <p:sldId id="264" r:id="rId24"/>
-    <p:sldId id="290" r:id="rId25"/>
-    <p:sldId id="294" r:id="rId26"/>
-    <p:sldId id="265" r:id="rId27"/>
-    <p:sldId id="292" r:id="rId28"/>
-    <p:sldId id="268" r:id="rId29"/>
+    <p:sldId id="296" r:id="rId14"/>
+    <p:sldId id="279" r:id="rId15"/>
+    <p:sldId id="280" r:id="rId16"/>
+    <p:sldId id="260" r:id="rId17"/>
+    <p:sldId id="282" r:id="rId18"/>
+    <p:sldId id="284" r:id="rId19"/>
+    <p:sldId id="262" r:id="rId20"/>
+    <p:sldId id="293" r:id="rId21"/>
+    <p:sldId id="286" r:id="rId22"/>
+    <p:sldId id="263" r:id="rId23"/>
+    <p:sldId id="288" r:id="rId24"/>
+    <p:sldId id="264" r:id="rId25"/>
+    <p:sldId id="290" r:id="rId26"/>
+    <p:sldId id="294" r:id="rId27"/>
+    <p:sldId id="265" r:id="rId28"/>
+    <p:sldId id="292" r:id="rId29"/>
+    <p:sldId id="268" r:id="rId30"/>
   </p:sldIdLst>
   <p:sldSz cx="9144000" cy="5143500" type="screen16x9"/>
   <p:notesSz cx="6858000" cy="9144000"/>
+  <p:embeddedFontLst>
+    <p:embeddedFont>
+      <p:font typeface="FontAwesome" pitchFamily="2" charset="0"/>
+      <p:regular r:id="rId32"/>
+    </p:embeddedFont>
+    <p:embeddedFont>
+      <p:font typeface="Calibri" panose="020F0502020204030204" pitchFamily="34" charset="0"/>
+      <p:regular r:id="rId33"/>
+      <p:bold r:id="rId34"/>
+      <p:italic r:id="rId35"/>
+      <p:boldItalic r:id="rId36"/>
+    </p:embeddedFont>
+    <p:embeddedFont>
+      <p:font typeface="Segoe UI" panose="020B0502040204020203" pitchFamily="34" charset="0"/>
+      <p:regular r:id="rId37"/>
+      <p:bold r:id="rId38"/>
+      <p:italic r:id="rId39"/>
+      <p:boldItalic r:id="rId40"/>
+    </p:embeddedFont>
+    <p:embeddedFont>
+      <p:font typeface="Segoe UI Light" panose="020B0502040204020203" pitchFamily="34" charset="0"/>
+      <p:regular r:id="rId41"/>
+      <p:italic r:id="rId42"/>
+    </p:embeddedFont>
+    <p:embeddedFont>
+      <p:font typeface="Clubland" panose="02000500000000000000" pitchFamily="2" charset="0"/>
+      <p:regular r:id="rId43"/>
+    </p:embeddedFont>
+  </p:embeddedFontLst>
   <p:defaultTextStyle>
     <a:defPPr>
       <a:defRPr lang="en-US"/>
@@ -235,7 +265,7 @@
           <a:p>
             <a:fld id="{601EE7AF-44E2-432D-B29B-E3A5CBB12A8F}" type="datetimeFigureOut">
               <a:rPr lang="en-US" smtClean="0"/>
-              <a:t>2/22/2014</a:t>
+              <a:t>5/22/2014</a:t>
             </a:fld>
             <a:endParaRPr lang="en-US" dirty="0"/>
           </a:p>
@@ -1045,15 +1075,29 @@
           <a:lstStyle/>
           <a:p>
             <a:r>
+              <a:rPr lang="en-US" dirty="0" smtClean="0"/>
+              <a:t>URI:</a:t>
+            </a:r>
+          </a:p>
+          <a:p>
+            <a:r>
+              <a:rPr lang="en-US" dirty="0" smtClean="0"/>
+              <a:t>Change the URI on any markdown file from GitHub.com to GitPrint.com</a:t>
+            </a:r>
+            <a:r>
               <a:rPr lang="en-US" baseline="0" dirty="0" smtClean="0"/>
-              <a:t>Issue Tags:</a:t>
-            </a:r>
+              <a:t> to convert the MD file to PDF</a:t>
+            </a:r>
+          </a:p>
+          <a:p>
+            <a:endParaRPr lang="en-US" baseline="0" dirty="0" smtClean="0"/>
           </a:p>
           <a:p>
             <a:r>
               <a:rPr lang="en-US" baseline="0" dirty="0" smtClean="0"/>
-              <a:t>[DEMO] Huboard.com - http://huboard.com/nikmd23/scratchPad/board</a:t>
-            </a:r>
+              <a:t>Example: https://gitprint.com/jquery/jquery/</a:t>
+            </a:r>
+            <a:endParaRPr lang="en-US" dirty="0" smtClean="0"/>
           </a:p>
         </p:txBody>
       </p:sp>
@@ -1083,7 +1127,7 @@
     </p:spTree>
     <p:extLst>
       <p:ext uri="{BB962C8B-B14F-4D97-AF65-F5344CB8AC3E}">
-        <p14:creationId xmlns:p14="http://schemas.microsoft.com/office/powerpoint/2010/main" val="170236656"/>
+        <p14:creationId xmlns:p14="http://schemas.microsoft.com/office/powerpoint/2010/main" val="2833340705"/>
       </p:ext>
     </p:extLst>
   </p:cSld>
@@ -1139,39 +1183,13 @@
           <a:p>
             <a:r>
               <a:rPr lang="en-US" baseline="0" dirty="0" smtClean="0"/>
-              <a:t>[DEMO] </a:t>
-            </a:r>
-            <a:r>
-              <a:rPr lang="en-US" baseline="0" dirty="0" err="1" smtClean="0"/>
-              <a:t>Gists</a:t>
-            </a:r>
+              <a:t>Issue Tags:</a:t>
+            </a:r>
+          </a:p>
+          <a:p>
             <a:r>
               <a:rPr lang="en-US" baseline="0" dirty="0" smtClean="0"/>
-              <a:t> – </a:t>
-            </a:r>
-            <a:r>
-              <a:rPr lang="en-US" baseline="0" dirty="0" err="1" smtClean="0"/>
-              <a:t>jsFiddle</a:t>
-            </a:r>
-            <a:r>
-              <a:rPr lang="en-US" baseline="0" dirty="0" smtClean="0"/>
-              <a:t> demo - </a:t>
-            </a:r>
-            <a:r>
-              <a:rPr lang="en-US" sz="1200" kern="1200" dirty="0" smtClean="0">
-                <a:solidFill>
-                  <a:schemeClr val="tx1"/>
-                </a:solidFill>
-                <a:effectLst/>
-                <a:latin typeface="+mn-lt"/>
-                <a:ea typeface="+mn-ea"/>
-                <a:cs typeface="+mn-cs"/>
-              </a:rPr>
-              <a:t>http://doc.jsfiddle.net/use/gist_read.html  </a:t>
-            </a:r>
-            <a:r>
-              <a:rPr lang="en-US" baseline="0" dirty="0" smtClean="0"/>
-              <a:t>http://jsfiddle.net/3HJF4/</a:t>
+              <a:t>[DEMO] Huboard.com - http://huboard.com/nikmd23/scratchPad/board</a:t>
             </a:r>
           </a:p>
         </p:txBody>
@@ -1202,7 +1220,7 @@
     </p:spTree>
     <p:extLst>
       <p:ext uri="{BB962C8B-B14F-4D97-AF65-F5344CB8AC3E}">
-        <p14:creationId xmlns:p14="http://schemas.microsoft.com/office/powerpoint/2010/main" val="1955612231"/>
+        <p14:creationId xmlns:p14="http://schemas.microsoft.com/office/powerpoint/2010/main" val="170236656"/>
       </p:ext>
     </p:extLst>
   </p:cSld>
@@ -1256,7 +1274,42 @@
           <a:bodyPr/>
           <a:lstStyle/>
           <a:p>
-            <a:endParaRPr lang="en-US" dirty="0"/>
+            <a:r>
+              <a:rPr lang="en-US" baseline="0" dirty="0" smtClean="0"/>
+              <a:t>[DEMO] </a:t>
+            </a:r>
+            <a:r>
+              <a:rPr lang="en-US" baseline="0" dirty="0" err="1" smtClean="0"/>
+              <a:t>Gists</a:t>
+            </a:r>
+            <a:r>
+              <a:rPr lang="en-US" baseline="0" dirty="0" smtClean="0"/>
+              <a:t> – </a:t>
+            </a:r>
+            <a:r>
+              <a:rPr lang="en-US" baseline="0" dirty="0" err="1" smtClean="0"/>
+              <a:t>jsFiddle</a:t>
+            </a:r>
+            <a:r>
+              <a:rPr lang="en-US" baseline="0" dirty="0" smtClean="0"/>
+              <a:t> demo - </a:t>
+            </a:r>
+            <a:r>
+              <a:rPr lang="en-US" sz="1200" kern="1200" dirty="0" smtClean="0">
+                <a:solidFill>
+                  <a:schemeClr val="tx1"/>
+                </a:solidFill>
+                <a:effectLst/>
+                <a:latin typeface="+mn-lt"/>
+                <a:ea typeface="+mn-ea"/>
+                <a:cs typeface="+mn-cs"/>
+              </a:rPr>
+              <a:t>http://doc.jsfiddle.net/use/gist_read.html  </a:t>
+            </a:r>
+            <a:r>
+              <a:rPr lang="en-US" baseline="0" dirty="0" smtClean="0"/>
+              <a:t>http://jsfiddle.net/3HJF4/</a:t>
+            </a:r>
           </a:p>
         </p:txBody>
       </p:sp>
@@ -1286,7 +1339,7 @@
     </p:spTree>
     <p:extLst>
       <p:ext uri="{BB962C8B-B14F-4D97-AF65-F5344CB8AC3E}">
-        <p14:creationId xmlns:p14="http://schemas.microsoft.com/office/powerpoint/2010/main" val="3680194509"/>
+        <p14:creationId xmlns:p14="http://schemas.microsoft.com/office/powerpoint/2010/main" val="1955612231"/>
       </p:ext>
     </p:extLst>
   </p:cSld>
@@ -1340,16 +1393,7 @@
           <a:bodyPr/>
           <a:lstStyle/>
           <a:p>
-            <a:r>
-              <a:rPr lang="en-US" dirty="0" smtClean="0"/>
-              <a:t>Search:</a:t>
-            </a:r>
-          </a:p>
-          <a:p>
-            <a:r>
-              <a:rPr lang="en-US" dirty="0" smtClean="0"/>
-              <a:t>@nikmd23</a:t>
-            </a:r>
+            <a:endParaRPr lang="en-US" dirty="0"/>
           </a:p>
         </p:txBody>
       </p:sp>
@@ -1379,7 +1423,7 @@
     </p:spTree>
     <p:extLst>
       <p:ext uri="{BB962C8B-B14F-4D97-AF65-F5344CB8AC3E}">
-        <p14:creationId xmlns:p14="http://schemas.microsoft.com/office/powerpoint/2010/main" val="3939347599"/>
+        <p14:creationId xmlns:p14="http://schemas.microsoft.com/office/powerpoint/2010/main" val="3680194509"/>
       </p:ext>
     </p:extLst>
   </p:cSld>
@@ -1435,9 +1479,14 @@
           <a:p>
             <a:r>
               <a:rPr lang="en-US" dirty="0" smtClean="0"/>
-              <a:t>RSS to IFTTT</a:t>
-            </a:r>
-            <a:endParaRPr lang="en-US" dirty="0"/>
+              <a:t>Search:</a:t>
+            </a:r>
+          </a:p>
+          <a:p>
+            <a:r>
+              <a:rPr lang="en-US" dirty="0" smtClean="0"/>
+              <a:t>@nikmd23</a:t>
+            </a:r>
           </a:p>
         </p:txBody>
       </p:sp>
@@ -1467,7 +1516,7 @@
     </p:spTree>
     <p:extLst>
       <p:ext uri="{BB962C8B-B14F-4D97-AF65-F5344CB8AC3E}">
-        <p14:creationId xmlns:p14="http://schemas.microsoft.com/office/powerpoint/2010/main" val="1391780666"/>
+        <p14:creationId xmlns:p14="http://schemas.microsoft.com/office/powerpoint/2010/main" val="3939347599"/>
       </p:ext>
     </p:extLst>
   </p:cSld>
@@ -1523,52 +1572,8 @@
           <a:p>
             <a:r>
               <a:rPr lang="en-US" dirty="0" smtClean="0"/>
-              <a:t>Intro</a:t>
-            </a:r>
-            <a:r>
-              <a:rPr lang="en-US" baseline="0" dirty="0" smtClean="0"/>
-              <a:t> extensions – not really open/</a:t>
-            </a:r>
-            <a:r>
-              <a:rPr lang="en-US" baseline="0" dirty="0" err="1" smtClean="0"/>
-              <a:t>kinda</a:t>
-            </a:r>
-            <a:r>
-              <a:rPr lang="en-US" baseline="0" dirty="0" smtClean="0"/>
-              <a:t> proprietary. </a:t>
-            </a:r>
-          </a:p>
-          <a:p>
-            <a:endParaRPr lang="en-US" baseline="0" dirty="0" smtClean="0"/>
-          </a:p>
-          <a:p>
-            <a:r>
-              <a:rPr lang="en-US" baseline="0" dirty="0" err="1" smtClean="0"/>
-              <a:t>UserScripts</a:t>
-            </a:r>
-            <a:r>
-              <a:rPr lang="en-US" baseline="0" dirty="0" smtClean="0"/>
-              <a:t> are a bit more portable and easier to develop.</a:t>
-            </a:r>
-          </a:p>
-          <a:p>
-            <a:endParaRPr lang="en-US" baseline="0" dirty="0" smtClean="0"/>
-          </a:p>
-          <a:p>
-            <a:r>
-              <a:rPr lang="en-US" baseline="0" dirty="0" err="1" smtClean="0"/>
-              <a:t>voterScript</a:t>
-            </a:r>
-            <a:r>
-              <a:rPr lang="en-US" baseline="0" dirty="0" smtClean="0"/>
-              <a:t> – no need to show </a:t>
-            </a:r>
-            <a:r>
-              <a:rPr lang="en-US" baseline="0" smtClean="0"/>
-              <a:t>the token hider.</a:t>
-            </a:r>
-          </a:p>
-          <a:p>
+              <a:t>RSS to IFTTT</a:t>
+            </a:r>
             <a:endParaRPr lang="en-US" dirty="0"/>
           </a:p>
         </p:txBody>
@@ -1599,7 +1604,7 @@
     </p:spTree>
     <p:extLst>
       <p:ext uri="{BB962C8B-B14F-4D97-AF65-F5344CB8AC3E}">
-        <p14:creationId xmlns:p14="http://schemas.microsoft.com/office/powerpoint/2010/main" val="1651495868"/>
+        <p14:creationId xmlns:p14="http://schemas.microsoft.com/office/powerpoint/2010/main" val="1391780666"/>
       </p:ext>
     </p:extLst>
   </p:cSld>
@@ -1654,8 +1659,50 @@
           <a:lstStyle/>
           <a:p>
             <a:r>
+              <a:rPr lang="en-US" dirty="0" smtClean="0"/>
+              <a:t>Intro</a:t>
+            </a:r>
+            <a:r>
               <a:rPr lang="en-US" baseline="0" dirty="0" smtClean="0"/>
-              <a:t>Demo at https://github.com/Glimpse/Glimpse/tree/master/source/Glimpse.Core/Framework</a:t>
+              <a:t> extensions – not really open/</a:t>
+            </a:r>
+            <a:r>
+              <a:rPr lang="en-US" baseline="0" dirty="0" err="1" smtClean="0"/>
+              <a:t>kinda</a:t>
+            </a:r>
+            <a:r>
+              <a:rPr lang="en-US" baseline="0" dirty="0" smtClean="0"/>
+              <a:t> proprietary. </a:t>
+            </a:r>
+          </a:p>
+          <a:p>
+            <a:endParaRPr lang="en-US" baseline="0" dirty="0" smtClean="0"/>
+          </a:p>
+          <a:p>
+            <a:r>
+              <a:rPr lang="en-US" baseline="0" dirty="0" err="1" smtClean="0"/>
+              <a:t>UserScripts</a:t>
+            </a:r>
+            <a:r>
+              <a:rPr lang="en-US" baseline="0" dirty="0" smtClean="0"/>
+              <a:t> are a bit more portable and easier to develop.</a:t>
+            </a:r>
+          </a:p>
+          <a:p>
+            <a:endParaRPr lang="en-US" baseline="0" dirty="0" smtClean="0"/>
+          </a:p>
+          <a:p>
+            <a:r>
+              <a:rPr lang="en-US" baseline="0" dirty="0" err="1" smtClean="0"/>
+              <a:t>voterScript</a:t>
+            </a:r>
+            <a:r>
+              <a:rPr lang="en-US" baseline="0" dirty="0" smtClean="0"/>
+              <a:t> – no need to show </a:t>
+            </a:r>
+            <a:r>
+              <a:rPr lang="en-US" baseline="0" smtClean="0"/>
+              <a:t>the token hider.</a:t>
             </a:r>
           </a:p>
           <a:p>
@@ -1689,7 +1736,7 @@
     </p:spTree>
     <p:extLst>
       <p:ext uri="{BB962C8B-B14F-4D97-AF65-F5344CB8AC3E}">
-        <p14:creationId xmlns:p14="http://schemas.microsoft.com/office/powerpoint/2010/main" val="1629993096"/>
+        <p14:creationId xmlns:p14="http://schemas.microsoft.com/office/powerpoint/2010/main" val="1651495868"/>
       </p:ext>
     </p:extLst>
   </p:cSld>
@@ -1853,46 +1900,8 @@
           <a:lstStyle/>
           <a:p>
             <a:r>
-              <a:rPr lang="en-US" dirty="0" smtClean="0"/>
-              <a:t>Intro</a:t>
-            </a:r>
-            <a:r>
               <a:rPr lang="en-US" baseline="0" dirty="0" smtClean="0"/>
-              <a:t> extensions – not really open/</a:t>
-            </a:r>
-            <a:r>
-              <a:rPr lang="en-US" baseline="0" dirty="0" err="1" smtClean="0"/>
-              <a:t>kinda</a:t>
-            </a:r>
-            <a:r>
-              <a:rPr lang="en-US" baseline="0" dirty="0" smtClean="0"/>
-              <a:t> proprietary. </a:t>
-            </a:r>
-          </a:p>
-          <a:p>
-            <a:endParaRPr lang="en-US" baseline="0" dirty="0" smtClean="0"/>
-          </a:p>
-          <a:p>
-            <a:r>
-              <a:rPr lang="en-US" baseline="0" dirty="0" err="1" smtClean="0"/>
-              <a:t>UserScripts</a:t>
-            </a:r>
-            <a:r>
-              <a:rPr lang="en-US" baseline="0" dirty="0" smtClean="0"/>
-              <a:t> are a bit more portable and easier to develop.</a:t>
-            </a:r>
-          </a:p>
-          <a:p>
-            <a:endParaRPr lang="en-US" baseline="0" dirty="0" smtClean="0"/>
-          </a:p>
-          <a:p>
-            <a:r>
-              <a:rPr lang="en-US" baseline="0" dirty="0" err="1" smtClean="0"/>
-              <a:t>voterScript</a:t>
-            </a:r>
-            <a:r>
-              <a:rPr lang="en-US" baseline="0" dirty="0" smtClean="0"/>
-              <a:t> – no need to show the token hider.</a:t>
+              <a:t>Demo at https://github.com/Glimpse/Glimpse/tree/master/source/Glimpse.Core/Framework</a:t>
             </a:r>
           </a:p>
           <a:p>
@@ -1926,7 +1935,7 @@
     </p:spTree>
     <p:extLst>
       <p:ext uri="{BB962C8B-B14F-4D97-AF65-F5344CB8AC3E}">
-        <p14:creationId xmlns:p14="http://schemas.microsoft.com/office/powerpoint/2010/main" val="1586406492"/>
+        <p14:creationId xmlns:p14="http://schemas.microsoft.com/office/powerpoint/2010/main" val="1629993096"/>
       </p:ext>
     </p:extLst>
   </p:cSld>
@@ -1986,63 +1995,44 @@
             </a:r>
             <a:r>
               <a:rPr lang="en-US" baseline="0" dirty="0" smtClean="0"/>
-              <a:t> </a:t>
+              <a:t> extensions – not really open/</a:t>
             </a:r>
             <a:r>
               <a:rPr lang="en-US" baseline="0" dirty="0" err="1" smtClean="0"/>
-              <a:t>webhooks</a:t>
-            </a:r>
-            <a:endParaRPr lang="en-US" dirty="0" smtClean="0"/>
-          </a:p>
-          <a:p>
-            <a:r>
-              <a:rPr lang="en-US" dirty="0" smtClean="0"/>
-              <a:t>Show </a:t>
-            </a:r>
-            <a:r>
-              <a:rPr lang="en-US" dirty="0" err="1" smtClean="0"/>
-              <a:t>github</a:t>
-            </a:r>
-            <a:r>
-              <a:rPr lang="en-US" dirty="0" smtClean="0"/>
-              <a:t> services – DEMO </a:t>
-            </a:r>
-            <a:r>
-              <a:rPr lang="en-US" dirty="0" err="1" smtClean="0"/>
-              <a:t>HipChat</a:t>
-            </a:r>
-            <a:r>
-              <a:rPr lang="en-US" dirty="0" smtClean="0"/>
-              <a:t>, Revision.io</a:t>
-            </a:r>
-          </a:p>
-          <a:p>
-            <a:r>
-              <a:rPr lang="en-US" dirty="0" smtClean="0"/>
-              <a:t>Demo </a:t>
-            </a:r>
-            <a:r>
-              <a:rPr lang="en-US" dirty="0" err="1" smtClean="0"/>
-              <a:t>ngrok</a:t>
-            </a:r>
-            <a:r>
-              <a:rPr lang="en-US" dirty="0" smtClean="0"/>
-              <a:t> for testing</a:t>
-            </a:r>
-          </a:p>
-          <a:p>
-            <a:r>
-              <a:rPr lang="en-US" dirty="0" smtClean="0"/>
-              <a:t>Show sample </a:t>
-            </a:r>
-            <a:r>
-              <a:rPr lang="en-US" dirty="0" err="1" smtClean="0"/>
-              <a:t>webhook</a:t>
-            </a:r>
-            <a:r>
-              <a:rPr lang="en-US" dirty="0" smtClean="0"/>
-              <a:t> code</a:t>
-            </a:r>
+              <a:t>kinda</a:t>
+            </a:r>
+            <a:r>
+              <a:rPr lang="en-US" baseline="0" dirty="0" smtClean="0"/>
+              <a:t> proprietary. </a:t>
+            </a:r>
+          </a:p>
+          <a:p>
+            <a:endParaRPr lang="en-US" baseline="0" dirty="0" smtClean="0"/>
+          </a:p>
+          <a:p>
+            <a:r>
+              <a:rPr lang="en-US" baseline="0" dirty="0" err="1" smtClean="0"/>
+              <a:t>UserScripts</a:t>
+            </a:r>
+            <a:r>
+              <a:rPr lang="en-US" baseline="0" dirty="0" smtClean="0"/>
+              <a:t> are a bit more portable and easier to develop.</a:t>
+            </a:r>
+          </a:p>
+          <a:p>
+            <a:endParaRPr lang="en-US" baseline="0" dirty="0" smtClean="0"/>
+          </a:p>
+          <a:p>
+            <a:r>
+              <a:rPr lang="en-US" baseline="0" dirty="0" err="1" smtClean="0"/>
+              <a:t>voterScript</a:t>
+            </a:r>
+            <a:r>
+              <a:rPr lang="en-US" baseline="0" dirty="0" smtClean="0"/>
+              <a:t> – no need to show the token hider.</a:t>
+            </a:r>
+          </a:p>
+          <a:p>
             <a:endParaRPr lang="en-US" dirty="0"/>
           </a:p>
         </p:txBody>
@@ -2073,7 +2063,7 @@
     </p:spTree>
     <p:extLst>
       <p:ext uri="{BB962C8B-B14F-4D97-AF65-F5344CB8AC3E}">
-        <p14:creationId xmlns:p14="http://schemas.microsoft.com/office/powerpoint/2010/main" val="2262619555"/>
+        <p14:creationId xmlns:p14="http://schemas.microsoft.com/office/powerpoint/2010/main" val="1586406492"/>
       </p:ext>
     </p:extLst>
   </p:cSld>
@@ -2220,7 +2210,7 @@
     </p:spTree>
     <p:extLst>
       <p:ext uri="{BB962C8B-B14F-4D97-AF65-F5344CB8AC3E}">
-        <p14:creationId xmlns:p14="http://schemas.microsoft.com/office/powerpoint/2010/main" val="3504276467"/>
+        <p14:creationId xmlns:p14="http://schemas.microsoft.com/office/powerpoint/2010/main" val="2262619555"/>
       </p:ext>
     </p:extLst>
   </p:cSld>
@@ -2276,73 +2266,67 @@
           <a:p>
             <a:r>
               <a:rPr lang="en-US" dirty="0" smtClean="0"/>
-              <a:t>DEMO: Show off </a:t>
+              <a:t>Intro</a:t>
+            </a:r>
+            <a:r>
+              <a:rPr lang="en-US" baseline="0" dirty="0" smtClean="0"/>
+              <a:t> </a:t>
+            </a:r>
+            <a:r>
+              <a:rPr lang="en-US" baseline="0" dirty="0" err="1" smtClean="0"/>
+              <a:t>webhooks</a:t>
+            </a:r>
+            <a:endParaRPr lang="en-US" dirty="0" smtClean="0"/>
+          </a:p>
+          <a:p>
+            <a:r>
+              <a:rPr lang="en-US" dirty="0" smtClean="0"/>
+              <a:t>Show </a:t>
             </a:r>
             <a:r>
               <a:rPr lang="en-US" dirty="0" err="1" smtClean="0"/>
-              <a:t>octoKit</a:t>
+              <a:t>github</a:t>
             </a:r>
             <a:r>
               <a:rPr lang="en-US" dirty="0" smtClean="0"/>
-              <a:t>?</a:t>
-            </a:r>
-          </a:p>
-          <a:p>
-            <a:endParaRPr lang="en-US" dirty="0" smtClean="0"/>
-          </a:p>
-          <a:p>
+              <a:t> services – DEMO </a:t>
+            </a:r>
+            <a:r>
+              <a:rPr lang="en-US" dirty="0" err="1" smtClean="0"/>
+              <a:t>HipChat</a:t>
+            </a:r>
             <a:r>
               <a:rPr lang="en-US" dirty="0" smtClean="0"/>
-              <a:t>Cover tokens &amp; basic concept</a:t>
-            </a:r>
-          </a:p>
-          <a:p>
+              <a:t>, Revision.io</a:t>
+            </a:r>
+          </a:p>
+          <a:p>
+            <a:r>
+              <a:rPr lang="en-US" dirty="0" smtClean="0"/>
+              <a:t>Demo </a:t>
+            </a:r>
             <a:r>
               <a:rPr lang="en-US" dirty="0" err="1" smtClean="0"/>
-              <a:t>WorldDomination</a:t>
-            </a:r>
-            <a:endParaRPr lang="en-US" dirty="0" smtClean="0"/>
-          </a:p>
-          <a:p>
+              <a:t>ngrok</a:t>
+            </a:r>
             <a:r>
               <a:rPr lang="en-US" dirty="0" smtClean="0"/>
-              <a:t>Things</a:t>
-            </a:r>
-            <a:r>
-              <a:rPr lang="en-US" baseline="0" dirty="0" smtClean="0"/>
-              <a:t> to know about </a:t>
-            </a:r>
-            <a:r>
-              <a:rPr lang="en-US" baseline="0" dirty="0" err="1" smtClean="0"/>
-              <a:t>GitHub</a:t>
-            </a:r>
-            <a:r>
-              <a:rPr lang="en-US" baseline="0" dirty="0" smtClean="0"/>
-              <a:t> API</a:t>
-            </a:r>
-          </a:p>
-          <a:p>
-            <a:pPr marL="171450" indent="-171450">
-              <a:buFontTx/>
-              <a:buChar char="-"/>
-            </a:pPr>
-            <a:r>
-              <a:rPr lang="en-US" baseline="0" dirty="0" smtClean="0"/>
-              <a:t>Rate limit</a:t>
-            </a:r>
-          </a:p>
-          <a:p>
-            <a:pPr marL="171450" indent="-171450">
-              <a:buFontTx/>
-              <a:buChar char="-"/>
-            </a:pPr>
-            <a:r>
-              <a:rPr lang="en-US" baseline="0" dirty="0" smtClean="0"/>
-              <a:t>Link headers</a:t>
-            </a:r>
-            <a:endParaRPr lang="en-US" dirty="0" smtClean="0"/>
-          </a:p>
-          <a:p>
+              <a:t> for testing</a:t>
+            </a:r>
+          </a:p>
+          <a:p>
+            <a:r>
+              <a:rPr lang="en-US" dirty="0" smtClean="0"/>
+              <a:t>Show sample </a:t>
+            </a:r>
+            <a:r>
+              <a:rPr lang="en-US" dirty="0" err="1" smtClean="0"/>
+              <a:t>webhook</a:t>
+            </a:r>
+            <a:r>
+              <a:rPr lang="en-US" dirty="0" smtClean="0"/>
+              <a:t> code</a:t>
+            </a:r>
             <a:endParaRPr lang="en-US" dirty="0"/>
           </a:p>
         </p:txBody>
@@ -2373,7 +2357,7 @@
     </p:spTree>
     <p:extLst>
       <p:ext uri="{BB962C8B-B14F-4D97-AF65-F5344CB8AC3E}">
-        <p14:creationId xmlns:p14="http://schemas.microsoft.com/office/powerpoint/2010/main" val="2842751512"/>
+        <p14:creationId xmlns:p14="http://schemas.microsoft.com/office/powerpoint/2010/main" val="3504276467"/>
       </p:ext>
     </p:extLst>
   </p:cSld>
@@ -2429,6 +2413,23 @@
           <a:p>
             <a:r>
               <a:rPr lang="en-US" dirty="0" smtClean="0"/>
+              <a:t>DEMO: Show off </a:t>
+            </a:r>
+            <a:r>
+              <a:rPr lang="en-US" dirty="0" err="1" smtClean="0"/>
+              <a:t>octoKit</a:t>
+            </a:r>
+            <a:r>
+              <a:rPr lang="en-US" dirty="0" smtClean="0"/>
+              <a:t>?</a:t>
+            </a:r>
+          </a:p>
+          <a:p>
+            <a:endParaRPr lang="en-US" dirty="0" smtClean="0"/>
+          </a:p>
+          <a:p>
+            <a:r>
+              <a:rPr lang="en-US" dirty="0" smtClean="0"/>
               <a:t>Cover tokens &amp; basic concept</a:t>
             </a:r>
           </a:p>
@@ -2509,7 +2510,7 @@
     </p:spTree>
     <p:extLst>
       <p:ext uri="{BB962C8B-B14F-4D97-AF65-F5344CB8AC3E}">
-        <p14:creationId xmlns:p14="http://schemas.microsoft.com/office/powerpoint/2010/main" val="2442674008"/>
+        <p14:creationId xmlns:p14="http://schemas.microsoft.com/office/powerpoint/2010/main" val="2842751512"/>
       </p:ext>
     </p:extLst>
   </p:cSld>
@@ -2565,11 +2566,52 @@
           <a:p>
             <a:r>
               <a:rPr lang="en-US" dirty="0" smtClean="0"/>
-              <a:t>DEMO the </a:t>
-            </a:r>
+              <a:t>Cover tokens &amp; basic concept</a:t>
+            </a:r>
+          </a:p>
+          <a:p>
             <a:r>
               <a:rPr lang="en-US" dirty="0" err="1" smtClean="0"/>
-              <a:t>OctokitDemo</a:t>
+              <a:t>WorldDomination</a:t>
+            </a:r>
+            <a:endParaRPr lang="en-US" dirty="0" smtClean="0"/>
+          </a:p>
+          <a:p>
+            <a:r>
+              <a:rPr lang="en-US" dirty="0" smtClean="0"/>
+              <a:t>Things</a:t>
+            </a:r>
+            <a:r>
+              <a:rPr lang="en-US" baseline="0" dirty="0" smtClean="0"/>
+              <a:t> to know about </a:t>
+            </a:r>
+            <a:r>
+              <a:rPr lang="en-US" baseline="0" dirty="0" err="1" smtClean="0"/>
+              <a:t>GitHub</a:t>
+            </a:r>
+            <a:r>
+              <a:rPr lang="en-US" baseline="0" dirty="0" smtClean="0"/>
+              <a:t> API</a:t>
+            </a:r>
+          </a:p>
+          <a:p>
+            <a:pPr marL="171450" indent="-171450">
+              <a:buFontTx/>
+              <a:buChar char="-"/>
+            </a:pPr>
+            <a:r>
+              <a:rPr lang="en-US" baseline="0" dirty="0" smtClean="0"/>
+              <a:t>Rate limit</a:t>
+            </a:r>
+          </a:p>
+          <a:p>
+            <a:pPr marL="171450" indent="-171450">
+              <a:buFontTx/>
+              <a:buChar char="-"/>
+            </a:pPr>
+            <a:r>
+              <a:rPr lang="en-US" baseline="0" dirty="0" smtClean="0"/>
+              <a:t>Link headers</a:t>
             </a:r>
             <a:endParaRPr lang="en-US" dirty="0" smtClean="0"/>
           </a:p>
@@ -2604,7 +2646,7 @@
     </p:spTree>
     <p:extLst>
       <p:ext uri="{BB962C8B-B14F-4D97-AF65-F5344CB8AC3E}">
-        <p14:creationId xmlns:p14="http://schemas.microsoft.com/office/powerpoint/2010/main" val="3889246926"/>
+        <p14:creationId xmlns:p14="http://schemas.microsoft.com/office/powerpoint/2010/main" val="2442674008"/>
       </p:ext>
     </p:extLst>
   </p:cSld>
@@ -2658,41 +2700,15 @@
           <a:bodyPr/>
           <a:lstStyle/>
           <a:p>
-            <a:pPr marL="0" marR="0" indent="0" algn="l" defTabSz="914400" rtl="0" eaLnBrk="1" fontAlgn="auto" latinLnBrk="0" hangingPunct="1">
-              <a:lnSpc>
-                <a:spcPct val="100000"/>
-              </a:lnSpc>
-              <a:spcBef>
-                <a:spcPts val="0"/>
-              </a:spcBef>
-              <a:spcAft>
-                <a:spcPts val="0"/>
-              </a:spcAft>
-              <a:buClrTx/>
-              <a:buSzTx/>
-              <a:buFontTx/>
-              <a:buNone/>
-              <a:tabLst/>
-              <a:defRPr/>
-            </a:pPr>
-            <a:r>
-              <a:rPr lang="en-US" dirty="0" smtClean="0">
-                <a:effectLst/>
-              </a:rPr>
-              <a:t>http://www.asciiflow.com/</a:t>
-            </a:r>
-            <a:r>
-              <a:rPr lang="en-US" baseline="0" dirty="0" smtClean="0">
-                <a:effectLst/>
-              </a:rPr>
-              <a:t> -&gt;</a:t>
-            </a:r>
-            <a:r>
-              <a:rPr lang="en-US" dirty="0" smtClean="0">
-                <a:effectLst/>
-              </a:rPr>
-              <a:t> https://github.com/Glimpse/Semantic-Release-Notes/issues/1</a:t>
-            </a:r>
+            <a:r>
+              <a:rPr lang="en-US" dirty="0" smtClean="0"/>
+              <a:t>DEMO the </a:t>
+            </a:r>
+            <a:r>
+              <a:rPr lang="en-US" dirty="0" err="1" smtClean="0"/>
+              <a:t>OctokitDemo</a:t>
+            </a:r>
+            <a:endParaRPr lang="en-US" dirty="0" smtClean="0"/>
           </a:p>
           <a:p>
             <a:endParaRPr lang="en-US" dirty="0"/>
@@ -2725,7 +2741,7 @@
     </p:spTree>
     <p:extLst>
       <p:ext uri="{BB962C8B-B14F-4D97-AF65-F5344CB8AC3E}">
-        <p14:creationId xmlns:p14="http://schemas.microsoft.com/office/powerpoint/2010/main" val="1016748500"/>
+        <p14:creationId xmlns:p14="http://schemas.microsoft.com/office/powerpoint/2010/main" val="3889246926"/>
       </p:ext>
     </p:extLst>
   </p:cSld>
@@ -2816,20 +2832,6 @@
             </a:r>
           </a:p>
           <a:p>
-            <a:r>
-              <a:rPr lang="en-US" dirty="0" err="1" smtClean="0"/>
-              <a:t>Memofon</a:t>
-            </a:r>
-            <a:r>
-              <a:rPr lang="en-US" dirty="0" smtClean="0"/>
-              <a:t> -&gt; Issue about the class hierarchy</a:t>
-            </a:r>
-          </a:p>
-          <a:p>
-            <a:r>
-              <a:rPr lang="en-US" dirty="0" err="1" smtClean="0"/>
-              <a:t>WebSequenceDiagrams</a:t>
-            </a:r>
             <a:endParaRPr lang="en-US" dirty="0"/>
           </a:p>
         </p:txBody>
@@ -2860,7 +2862,7 @@
     </p:spTree>
     <p:extLst>
       <p:ext uri="{BB962C8B-B14F-4D97-AF65-F5344CB8AC3E}">
-        <p14:creationId xmlns:p14="http://schemas.microsoft.com/office/powerpoint/2010/main" val="713897085"/>
+        <p14:creationId xmlns:p14="http://schemas.microsoft.com/office/powerpoint/2010/main" val="1016748500"/>
       </p:ext>
     </p:extLst>
   </p:cSld>
@@ -2897,6 +2899,141 @@
             <p:ph type="sldImg"/>
           </p:nvPr>
         </p:nvSpPr>
+        <p:spPr/>
+      </p:sp>
+      <p:sp>
+        <p:nvSpPr>
+          <p:cNvPr id="3" name="Notes Placeholder 2"/>
+          <p:cNvSpPr>
+            <a:spLocks noGrp="1"/>
+          </p:cNvSpPr>
+          <p:nvPr>
+            <p:ph type="body" idx="1"/>
+          </p:nvPr>
+        </p:nvSpPr>
+        <p:spPr/>
+        <p:txBody>
+          <a:bodyPr/>
+          <a:lstStyle/>
+          <a:p>
+            <a:pPr marL="0" marR="0" indent="0" algn="l" defTabSz="914400" rtl="0" eaLnBrk="1" fontAlgn="auto" latinLnBrk="0" hangingPunct="1">
+              <a:lnSpc>
+                <a:spcPct val="100000"/>
+              </a:lnSpc>
+              <a:spcBef>
+                <a:spcPts val="0"/>
+              </a:spcBef>
+              <a:spcAft>
+                <a:spcPts val="0"/>
+              </a:spcAft>
+              <a:buClrTx/>
+              <a:buSzTx/>
+              <a:buFontTx/>
+              <a:buNone/>
+              <a:tabLst/>
+              <a:defRPr/>
+            </a:pPr>
+            <a:r>
+              <a:rPr lang="en-US" dirty="0" smtClean="0">
+                <a:effectLst/>
+              </a:rPr>
+              <a:t>http://www.asciiflow.com/</a:t>
+            </a:r>
+            <a:r>
+              <a:rPr lang="en-US" baseline="0" dirty="0" smtClean="0">
+                <a:effectLst/>
+              </a:rPr>
+              <a:t> -&gt;</a:t>
+            </a:r>
+            <a:r>
+              <a:rPr lang="en-US" dirty="0" smtClean="0">
+                <a:effectLst/>
+              </a:rPr>
+              <a:t> https://github.com/Glimpse/Semantic-Release-Notes/issues/1</a:t>
+            </a:r>
+          </a:p>
+          <a:p>
+            <a:r>
+              <a:rPr lang="en-US" dirty="0" err="1" smtClean="0"/>
+              <a:t>Memofon</a:t>
+            </a:r>
+            <a:r>
+              <a:rPr lang="en-US" dirty="0" smtClean="0"/>
+              <a:t> -&gt; Issue about the class hierarchy</a:t>
+            </a:r>
+          </a:p>
+          <a:p>
+            <a:r>
+              <a:rPr lang="en-US" dirty="0" err="1" smtClean="0"/>
+              <a:t>WebSequenceDiagrams</a:t>
+            </a:r>
+            <a:endParaRPr lang="en-US" dirty="0"/>
+          </a:p>
+        </p:txBody>
+      </p:sp>
+      <p:sp>
+        <p:nvSpPr>
+          <p:cNvPr id="4" name="Slide Number Placeholder 3"/>
+          <p:cNvSpPr>
+            <a:spLocks noGrp="1"/>
+          </p:cNvSpPr>
+          <p:nvPr>
+            <p:ph type="sldNum" sz="quarter" idx="10"/>
+          </p:nvPr>
+        </p:nvSpPr>
+        <p:spPr/>
+        <p:txBody>
+          <a:bodyPr/>
+          <a:lstStyle/>
+          <a:p>
+            <a:fld id="{816DEF4C-023B-4E22-97E5-23ECA408D29F}" type="slidenum">
+              <a:rPr lang="en-US" smtClean="0"/>
+              <a:t>28</a:t>
+            </a:fld>
+            <a:endParaRPr lang="en-US" dirty="0"/>
+          </a:p>
+        </p:txBody>
+      </p:sp>
+    </p:spTree>
+    <p:extLst>
+      <p:ext uri="{BB962C8B-B14F-4D97-AF65-F5344CB8AC3E}">
+        <p14:creationId xmlns:p14="http://schemas.microsoft.com/office/powerpoint/2010/main" val="713897085"/>
+      </p:ext>
+    </p:extLst>
+  </p:cSld>
+  <p:clrMapOvr>
+    <a:masterClrMapping/>
+  </p:clrMapOvr>
+</p:notes>
+</file>
+
+<file path=ppt/notesSlides/notesSlide29.xml><?xml version="1.0" encoding="utf-8"?>
+<p:notes xmlns:a="http://schemas.openxmlformats.org/drawingml/2006/main" xmlns:r="http://schemas.openxmlformats.org/officeDocument/2006/relationships" xmlns:p="http://schemas.openxmlformats.org/presentationml/2006/main">
+  <p:cSld>
+    <p:spTree>
+      <p:nvGrpSpPr>
+        <p:cNvPr id="1" name=""/>
+        <p:cNvGrpSpPr/>
+        <p:nvPr/>
+      </p:nvGrpSpPr>
+      <p:grpSpPr>
+        <a:xfrm>
+          <a:off x="0" y="0"/>
+          <a:ext cx="0" cy="0"/>
+          <a:chOff x="0" y="0"/>
+          <a:chExt cx="0" cy="0"/>
+        </a:xfrm>
+      </p:grpSpPr>
+      <p:sp>
+        <p:nvSpPr>
+          <p:cNvPr id="2" name="Slide Image Placeholder 1"/>
+          <p:cNvSpPr>
+            <a:spLocks noGrp="1" noRot="1" noChangeAspect="1"/>
+          </p:cNvSpPr>
+          <p:nvPr>
+            <p:ph type="sldImg"/>
+          </p:nvPr>
+        </p:nvSpPr>
         <p:spPr>
           <a:xfrm>
             <a:off x="381000" y="685800"/>
@@ -2942,7 +3079,7 @@
           <a:p>
             <a:fld id="{816DEF4C-023B-4E22-97E5-23ECA408D29F}" type="slidenum">
               <a:rPr lang="en-US" smtClean="0"/>
-              <a:t>28</a:t>
+              <a:t>29</a:t>
             </a:fld>
             <a:endParaRPr lang="en-US" dirty="0"/>
           </a:p>
@@ -3881,7 +4018,7 @@
           <a:p>
             <a:fld id="{1B39C627-4E0D-4196-A366-E4292AEDF199}" type="datetimeFigureOut">
               <a:rPr lang="en-US" smtClean="0"/>
-              <a:t>2/22/2014</a:t>
+              <a:t>5/22/2014</a:t>
             </a:fld>
             <a:endParaRPr lang="en-US" dirty="0"/>
           </a:p>
@@ -4063,7 +4200,7 @@
           <a:p>
             <a:fld id="{1B39C627-4E0D-4196-A366-E4292AEDF199}" type="datetimeFigureOut">
               <a:rPr lang="en-US" smtClean="0"/>
-              <a:t>2/22/2014</a:t>
+              <a:t>5/22/2014</a:t>
             </a:fld>
             <a:endParaRPr lang="en-US" dirty="0"/>
           </a:p>
@@ -4255,7 +4392,7 @@
           <a:p>
             <a:fld id="{1B39C627-4E0D-4196-A366-E4292AEDF199}" type="datetimeFigureOut">
               <a:rPr lang="en-US" smtClean="0"/>
-              <a:t>2/22/2014</a:t>
+              <a:t>5/22/2014</a:t>
             </a:fld>
             <a:endParaRPr lang="en-US" dirty="0"/>
           </a:p>
@@ -4437,7 +4574,7 @@
           <a:p>
             <a:fld id="{1B39C627-4E0D-4196-A366-E4292AEDF199}" type="datetimeFigureOut">
               <a:rPr lang="en-US" smtClean="0"/>
-              <a:t>2/22/2014</a:t>
+              <a:t>5/22/2014</a:t>
             </a:fld>
             <a:endParaRPr lang="en-US" dirty="0"/>
           </a:p>
@@ -4695,7 +4832,7 @@
           <a:p>
             <a:fld id="{1B39C627-4E0D-4196-A366-E4292AEDF199}" type="datetimeFigureOut">
               <a:rPr lang="en-US" smtClean="0"/>
-              <a:t>2/22/2014</a:t>
+              <a:t>5/22/2014</a:t>
             </a:fld>
             <a:endParaRPr lang="en-US" dirty="0"/>
           </a:p>
@@ -4995,7 +5132,7 @@
           <a:p>
             <a:fld id="{1B39C627-4E0D-4196-A366-E4292AEDF199}" type="datetimeFigureOut">
               <a:rPr lang="en-US" smtClean="0"/>
-              <a:t>2/22/2014</a:t>
+              <a:t>5/22/2014</a:t>
             </a:fld>
             <a:endParaRPr lang="en-US" dirty="0"/>
           </a:p>
@@ -5429,7 +5566,7 @@
           <a:p>
             <a:fld id="{1B39C627-4E0D-4196-A366-E4292AEDF199}" type="datetimeFigureOut">
               <a:rPr lang="en-US" smtClean="0"/>
-              <a:t>2/22/2014</a:t>
+              <a:t>5/22/2014</a:t>
             </a:fld>
             <a:endParaRPr lang="en-US" dirty="0"/>
           </a:p>
@@ -5559,7 +5696,7 @@
           <a:p>
             <a:fld id="{1B39C627-4E0D-4196-A366-E4292AEDF199}" type="datetimeFigureOut">
               <a:rPr lang="en-US" smtClean="0"/>
-              <a:t>2/22/2014</a:t>
+              <a:t>5/22/2014</a:t>
             </a:fld>
             <a:endParaRPr lang="en-US" dirty="0"/>
           </a:p>
@@ -5666,7 +5803,7 @@
           <a:p>
             <a:fld id="{1B39C627-4E0D-4196-A366-E4292AEDF199}" type="datetimeFigureOut">
               <a:rPr lang="en-US" smtClean="0"/>
-              <a:t>2/22/2014</a:t>
+              <a:t>5/22/2014</a:t>
             </a:fld>
             <a:endParaRPr lang="en-US" dirty="0"/>
           </a:p>
@@ -5955,7 +6092,7 @@
           <a:p>
             <a:fld id="{1B39C627-4E0D-4196-A366-E4292AEDF199}" type="datetimeFigureOut">
               <a:rPr lang="en-US" smtClean="0"/>
-              <a:t>2/22/2014</a:t>
+              <a:t>5/22/2014</a:t>
             </a:fld>
             <a:endParaRPr lang="en-US" dirty="0"/>
           </a:p>
@@ -6220,7 +6357,7 @@
           <a:p>
             <a:fld id="{1B39C627-4E0D-4196-A366-E4292AEDF199}" type="datetimeFigureOut">
               <a:rPr lang="en-US" smtClean="0"/>
-              <a:t>2/22/2014</a:t>
+              <a:t>5/22/2014</a:t>
             </a:fld>
             <a:endParaRPr lang="en-US" dirty="0"/>
           </a:p>
@@ -6454,7 +6591,7 @@
           <a:p>
             <a:fld id="{1B39C627-4E0D-4196-A366-E4292AEDF199}" type="datetimeFigureOut">
               <a:rPr lang="en-US" smtClean="0"/>
-              <a:t>2/22/2014</a:t>
+              <a:t>5/22/2014</a:t>
             </a:fld>
             <a:endParaRPr lang="en-US" dirty="0"/>
           </a:p>
@@ -7396,6 +7533,162 @@
       </p:sp>
       <p:sp>
         <p:nvSpPr>
+          <p:cNvPr id="4" name="TextBox 3" descr=" 8"/>
+          <p:cNvSpPr txBox="1"/>
+          <p:nvPr/>
+        </p:nvSpPr>
+        <p:spPr>
+          <a:xfrm>
+            <a:off x="3200400" y="1885712"/>
+            <a:ext cx="1301959" cy="923330"/>
+          </a:xfrm>
+          <a:prstGeom prst="rect">
+            <a:avLst/>
+          </a:prstGeom>
+          <a:noFill/>
+        </p:spPr>
+        <p:txBody>
+          <a:bodyPr wrap="none" rtlCol="0">
+            <a:spAutoFit/>
+          </a:bodyPr>
+          <a:lstStyle/>
+          <a:p>
+            <a:r>
+              <a:rPr lang="en-US" sz="4000" dirty="0" err="1" smtClean="0"/>
+              <a:t>uri</a:t>
+            </a:r>
+            <a:endParaRPr lang="en-US" sz="4000" dirty="0" smtClean="0"/>
+          </a:p>
+          <a:p>
+            <a:r>
+              <a:rPr lang="en-US" sz="1400" dirty="0" smtClean="0">
+                <a:solidFill>
+                  <a:srgbClr val="A7A7A7"/>
+                </a:solidFill>
+                <a:latin typeface="FontAwesome" pitchFamily="2" charset="0"/>
+              </a:rPr>
+              <a:t> </a:t>
+            </a:r>
+            <a:r>
+              <a:rPr lang="en-US" sz="1400" dirty="0" smtClean="0">
+                <a:latin typeface="Segoe UI Light" pitchFamily="34" charset="0"/>
+              </a:rPr>
+              <a:t>gitprint.com</a:t>
+            </a:r>
+            <a:endParaRPr lang="en-US" sz="1600" dirty="0"/>
+          </a:p>
+        </p:txBody>
+      </p:sp>
+      <p:sp>
+        <p:nvSpPr>
+          <p:cNvPr id="5" name="TextBox 4"/>
+          <p:cNvSpPr txBox="1"/>
+          <p:nvPr/>
+        </p:nvSpPr>
+        <p:spPr>
+          <a:xfrm>
+            <a:off x="1143000" y="1504950"/>
+            <a:ext cx="1981200" cy="1862048"/>
+          </a:xfrm>
+          <a:prstGeom prst="rect">
+            <a:avLst/>
+          </a:prstGeom>
+          <a:noFill/>
+        </p:spPr>
+        <p:txBody>
+          <a:bodyPr wrap="square" rtlCol="0">
+            <a:spAutoFit/>
+          </a:bodyPr>
+          <a:lstStyle/>
+          <a:p>
+            <a:pPr algn="ctr"/>
+            <a:r>
+              <a:rPr lang="en-US" sz="11500" dirty="0" smtClean="0">
+                <a:latin typeface="FontAwesome" pitchFamily="2" charset="0"/>
+              </a:rPr>
+              <a:t></a:t>
+            </a:r>
+            <a:endParaRPr lang="en-US" sz="1600" dirty="0">
+              <a:latin typeface="FontAwesome" pitchFamily="2" charset="0"/>
+            </a:endParaRPr>
+          </a:p>
+        </p:txBody>
+      </p:sp>
+    </p:spTree>
+    <p:extLst>
+      <p:ext uri="{BB962C8B-B14F-4D97-AF65-F5344CB8AC3E}">
+        <p14:creationId xmlns:p14="http://schemas.microsoft.com/office/powerpoint/2010/main" val="4184461035"/>
+      </p:ext>
+    </p:extLst>
+  </p:cSld>
+  <p:clrMapOvr>
+    <a:masterClrMapping/>
+  </p:clrMapOvr>
+  <mc:AlternateContent xmlns:mc="http://schemas.openxmlformats.org/markup-compatibility/2006">
+    <mc:Choice xmlns:p14="http://schemas.microsoft.com/office/powerpoint/2010/main" Requires="p14">
+      <p:transition spd="slow" p14:dur="1500">
+        <p:cut/>
+      </p:transition>
+    </mc:Choice>
+    <mc:Fallback>
+      <p:transition spd="slow">
+        <p:cut/>
+      </p:transition>
+    </mc:Fallback>
+  </mc:AlternateContent>
+  <p:timing>
+    <p:tnLst>
+      <p:par>
+        <p:cTn id="1" dur="indefinite" restart="never" nodeType="tmRoot"/>
+      </p:par>
+    </p:tnLst>
+  </p:timing>
+</p:sld>
+</file>
+
+<file path=ppt/slides/slide14.xml><?xml version="1.0" encoding="utf-8"?>
+<p:sld xmlns:a="http://schemas.openxmlformats.org/drawingml/2006/main" xmlns:r="http://schemas.openxmlformats.org/officeDocument/2006/relationships" xmlns:p="http://schemas.openxmlformats.org/presentationml/2006/main">
+  <p:cSld>
+    <p:spTree>
+      <p:nvGrpSpPr>
+        <p:cNvPr id="1" name=""/>
+        <p:cNvGrpSpPr/>
+        <p:nvPr/>
+      </p:nvGrpSpPr>
+      <p:grpSpPr>
+        <a:xfrm>
+          <a:off x="0" y="0"/>
+          <a:ext cx="0" cy="0"/>
+          <a:chOff x="0" y="0"/>
+          <a:chExt cx="0" cy="0"/>
+        </a:xfrm>
+      </p:grpSpPr>
+      <p:sp>
+        <p:nvSpPr>
+          <p:cNvPr id="2" name="Title 1" descr=" 2"/>
+          <p:cNvSpPr>
+            <a:spLocks noGrp="1"/>
+          </p:cNvSpPr>
+          <p:nvPr>
+            <p:ph type="title"/>
+          </p:nvPr>
+        </p:nvSpPr>
+        <p:spPr/>
+        <p:txBody>
+          <a:bodyPr/>
+          <a:lstStyle/>
+          <a:p>
+            <a:pPr algn="l"/>
+            <a:r>
+              <a:rPr lang="en-US" dirty="0" smtClean="0"/>
+              <a:t>Conventions</a:t>
+            </a:r>
+            <a:endParaRPr lang="en-US" dirty="0"/>
+          </a:p>
+        </p:txBody>
+      </p:sp>
+      <p:sp>
+        <p:nvSpPr>
           <p:cNvPr id="6" name="TextBox 5" descr=" 10"/>
           <p:cNvSpPr txBox="1"/>
           <p:nvPr/>
@@ -7549,7 +7842,7 @@
 </p:sld>
 </file>
 
-<file path=ppt/slides/slide14.xml><?xml version="1.0" encoding="utf-8"?>
+<file path=ppt/slides/slide15.xml><?xml version="1.0" encoding="utf-8"?>
 <p:sld xmlns:a="http://schemas.openxmlformats.org/drawingml/2006/main" xmlns:r="http://schemas.openxmlformats.org/officeDocument/2006/relationships" xmlns:p="http://schemas.openxmlformats.org/presentationml/2006/main">
   <p:cSld>
     <p:spTree>
@@ -7710,7 +8003,7 @@
 </p:sld>
 </file>
 
-<file path=ppt/slides/slide15.xml><?xml version="1.0" encoding="utf-8"?>
+<file path=ppt/slides/slide16.xml><?xml version="1.0" encoding="utf-8"?>
 <p:sld xmlns:a="http://schemas.openxmlformats.org/drawingml/2006/main" xmlns:r="http://schemas.openxmlformats.org/officeDocument/2006/relationships" xmlns:p="http://schemas.openxmlformats.org/presentationml/2006/main">
   <p:cSld>
     <p:spTree>
@@ -7783,7 +8076,7 @@
 </p:sld>
 </file>
 
-<file path=ppt/slides/slide16.xml><?xml version="1.0" encoding="utf-8"?>
+<file path=ppt/slides/slide17.xml><?xml version="1.0" encoding="utf-8"?>
 <p:sld xmlns:a="http://schemas.openxmlformats.org/drawingml/2006/main" xmlns:r="http://schemas.openxmlformats.org/officeDocument/2006/relationships" xmlns:p="http://schemas.openxmlformats.org/presentationml/2006/main">
   <p:cSld>
     <p:spTree>
@@ -7946,7 +8239,7 @@
 </p:sld>
 </file>
 
-<file path=ppt/slides/slide17.xml><?xml version="1.0" encoding="utf-8"?>
+<file path=ppt/slides/slide18.xml><?xml version="1.0" encoding="utf-8"?>
 <p:sld xmlns:a="http://schemas.openxmlformats.org/drawingml/2006/main" xmlns:r="http://schemas.openxmlformats.org/officeDocument/2006/relationships" xmlns:p="http://schemas.openxmlformats.org/presentationml/2006/main">
   <p:cSld>
     <p:spTree>
@@ -8109,78 +8402,6 @@
 </p:sld>
 </file>
 
-<file path=ppt/slides/slide18.xml><?xml version="1.0" encoding="utf-8"?>
-<p:sld xmlns:a="http://schemas.openxmlformats.org/drawingml/2006/main" xmlns:r="http://schemas.openxmlformats.org/officeDocument/2006/relationships" xmlns:p="http://schemas.openxmlformats.org/presentationml/2006/main">
-  <p:cSld>
-    <p:spTree>
-      <p:nvGrpSpPr>
-        <p:cNvPr id="1" name=""/>
-        <p:cNvGrpSpPr/>
-        <p:nvPr/>
-      </p:nvGrpSpPr>
-      <p:grpSpPr>
-        <a:xfrm>
-          <a:off x="0" y="0"/>
-          <a:ext cx="0" cy="0"/>
-          <a:chOff x="0" y="0"/>
-          <a:chExt cx="0" cy="0"/>
-        </a:xfrm>
-      </p:grpSpPr>
-      <p:sp>
-        <p:nvSpPr>
-          <p:cNvPr id="2" name="Title 1" descr=" 2"/>
-          <p:cNvSpPr>
-            <a:spLocks noGrp="1"/>
-          </p:cNvSpPr>
-          <p:nvPr>
-            <p:ph type="title"/>
-          </p:nvPr>
-        </p:nvSpPr>
-        <p:spPr/>
-        <p:txBody>
-          <a:bodyPr/>
-          <a:lstStyle/>
-          <a:p>
-            <a:pPr algn="l"/>
-            <a:r>
-              <a:rPr lang="en-US" dirty="0"/>
-              <a:t>Extensions</a:t>
-            </a:r>
-          </a:p>
-        </p:txBody>
-      </p:sp>
-    </p:spTree>
-    <p:extLst>
-      <p:ext uri="{BB962C8B-B14F-4D97-AF65-F5344CB8AC3E}">
-        <p14:creationId xmlns:p14="http://schemas.microsoft.com/office/powerpoint/2010/main" val="2048159947"/>
-      </p:ext>
-    </p:extLst>
-  </p:cSld>
-  <p:clrMapOvr>
-    <a:masterClrMapping/>
-  </p:clrMapOvr>
-  <mc:AlternateContent xmlns:mc="http://schemas.openxmlformats.org/markup-compatibility/2006" xmlns:p14="http://schemas.microsoft.com/office/powerpoint/2010/main">
-    <mc:Choice Requires="p14">
-      <p:transition spd="slow" p14:dur="1500">
-        <p:cut/>
-      </p:transition>
-    </mc:Choice>
-    <mc:Fallback xmlns="">
-      <p:transition spd="slow">
-        <p:cut/>
-      </p:transition>
-    </mc:Fallback>
-  </mc:AlternateContent>
-  <p:timing>
-    <p:tnLst>
-      <p:par>
-        <p:cTn id="1" dur="indefinite" restart="never" nodeType="tmRoot"/>
-      </p:par>
-    </p:tnLst>
-  </p:timing>
-</p:sld>
-</file>
-
 <file path=ppt/slides/slide19.xml><?xml version="1.0" encoding="utf-8"?>
 <p:sld xmlns:a="http://schemas.openxmlformats.org/drawingml/2006/main" xmlns:r="http://schemas.openxmlformats.org/officeDocument/2006/relationships" xmlns:p="http://schemas.openxmlformats.org/presentationml/2006/main">
   <p:cSld>
@@ -8198,36 +8419,6 @@
           <a:chExt cx="0" cy="0"/>
         </a:xfrm>
       </p:grpSpPr>
-      <p:pic>
-        <p:nvPicPr>
-          <p:cNvPr id="5" name="Picture 4"/>
-          <p:cNvPicPr>
-            <a:picLocks noChangeAspect="1"/>
-          </p:cNvPicPr>
-          <p:nvPr/>
-        </p:nvPicPr>
-        <p:blipFill>
-          <a:blip r:embed="rId3" cstate="print">
-            <a:extLst>
-              <a:ext uri="{28A0092B-C50C-407E-A947-70E740481C1C}">
-                <a14:useLocalDpi xmlns:a14="http://schemas.microsoft.com/office/drawing/2010/main" val="0"/>
-              </a:ext>
-            </a:extLst>
-          </a:blip>
-          <a:stretch>
-            <a:fillRect/>
-          </a:stretch>
-        </p:blipFill>
-        <p:spPr>
-          <a:xfrm>
-            <a:off x="1218962" y="1657350"/>
-            <a:ext cx="1905238" cy="1905238"/>
-          </a:xfrm>
-          <a:prstGeom prst="rect">
-            <a:avLst/>
-          </a:prstGeom>
-        </p:spPr>
-      </p:pic>
       <p:sp>
         <p:nvSpPr>
           <p:cNvPr id="2" name="Title 1" descr=" 2"/>
@@ -8248,80 +8439,13 @@
               <a:rPr lang="en-US" dirty="0"/>
               <a:t>Extensions</a:t>
             </a:r>
-          </a:p>
-        </p:txBody>
-      </p:sp>
-      <p:sp>
-        <p:nvSpPr>
-          <p:cNvPr id="4" name="TextBox 3" descr=" 6"/>
-          <p:cNvSpPr txBox="1"/>
-          <p:nvPr/>
-        </p:nvSpPr>
-        <p:spPr>
-          <a:xfrm>
-            <a:off x="3200400" y="1885712"/>
-            <a:ext cx="4516429" cy="954107"/>
-          </a:xfrm>
-          <a:prstGeom prst="rect">
-            <a:avLst/>
-          </a:prstGeom>
-          <a:noFill/>
-        </p:spPr>
-        <p:txBody>
-          <a:bodyPr wrap="none" rtlCol="0">
-            <a:spAutoFit/>
-          </a:bodyPr>
-          <a:lstStyle/>
-          <a:p>
-            <a:r>
-              <a:rPr lang="en-US" sz="4000" dirty="0" smtClean="0"/>
-              <a:t>browser extensions</a:t>
-            </a:r>
-          </a:p>
-          <a:p>
-            <a:r>
-              <a:rPr lang="en-US" sz="1600" dirty="0" smtClean="0">
-                <a:solidFill>
-                  <a:srgbClr val="A7A7A7"/>
-                </a:solidFill>
-                <a:latin typeface="FontAwesome" pitchFamily="2" charset="0"/>
-              </a:rPr>
-              <a:t></a:t>
-            </a:r>
-            <a:r>
-              <a:rPr lang="en-US" sz="1600" dirty="0" smtClean="0">
-                <a:latin typeface="FontAwesome" pitchFamily="2" charset="0"/>
-              </a:rPr>
-              <a:t> </a:t>
-            </a:r>
-            <a:r>
-              <a:rPr lang="en-US" sz="1400" dirty="0" err="1">
-                <a:latin typeface="Segoe UI Light" pitchFamily="34" charset="0"/>
-              </a:rPr>
-              <a:t>phillip-haydon</a:t>
-            </a:r>
-            <a:r>
-              <a:rPr lang="en-US" sz="1400" dirty="0">
-                <a:latin typeface="Segoe UI Light" pitchFamily="34" charset="0"/>
-              </a:rPr>
-              <a:t>/</a:t>
-            </a:r>
-            <a:r>
-              <a:rPr lang="en-US" sz="1400" dirty="0" err="1">
-                <a:latin typeface="Segoe UI Light" pitchFamily="34" charset="0"/>
-              </a:rPr>
-              <a:t>github.expandinizr</a:t>
-            </a:r>
-            <a:endParaRPr lang="en-US" sz="1400" dirty="0">
-              <a:latin typeface="Segoe UI Light" pitchFamily="34" charset="0"/>
-            </a:endParaRPr>
           </a:p>
         </p:txBody>
       </p:sp>
     </p:spTree>
     <p:extLst>
       <p:ext uri="{BB962C8B-B14F-4D97-AF65-F5344CB8AC3E}">
-        <p14:creationId xmlns:p14="http://schemas.microsoft.com/office/powerpoint/2010/main" val="826445166"/>
+        <p14:creationId xmlns:p14="http://schemas.microsoft.com/office/powerpoint/2010/main" val="2048159947"/>
       </p:ext>
     </p:extLst>
   </p:cSld>
@@ -8620,34 +8744,11 @@
           <a:chExt cx="0" cy="0"/>
         </a:xfrm>
       </p:grpSpPr>
-      <p:sp>
-        <p:nvSpPr>
-          <p:cNvPr id="2" name="Title 1" descr=" 2"/>
-          <p:cNvSpPr>
-            <a:spLocks noGrp="1"/>
-          </p:cNvSpPr>
-          <p:nvPr>
-            <p:ph type="title"/>
-          </p:nvPr>
-        </p:nvSpPr>
-        <p:spPr/>
-        <p:txBody>
-          <a:bodyPr/>
-          <a:lstStyle/>
-          <a:p>
-            <a:pPr algn="l"/>
-            <a:r>
-              <a:rPr lang="en-US" dirty="0"/>
-              <a:t>Extensions</a:t>
-            </a:r>
-          </a:p>
-        </p:txBody>
-      </p:sp>
       <p:pic>
         <p:nvPicPr>
-          <p:cNvPr id="3" name="Picture 2" descr=" 1026"/>
+          <p:cNvPr id="5" name="Picture 4"/>
           <p:cNvPicPr>
-            <a:picLocks noChangeAspect="1" noChangeArrowheads="1"/>
+            <a:picLocks noChangeAspect="1"/>
           </p:cNvPicPr>
           <p:nvPr/>
         </p:nvPicPr>
@@ -8659,31 +8760,43 @@
               </a:ext>
             </a:extLst>
           </a:blip>
-          <a:srcRect/>
           <a:stretch>
             <a:fillRect/>
           </a:stretch>
         </p:blipFill>
-        <p:spPr bwMode="auto">
+        <p:spPr>
           <a:xfrm>
-            <a:off x="1371362" y="1809750"/>
-            <a:ext cx="1600438" cy="1600438"/>
+            <a:off x="1218962" y="1657350"/>
+            <a:ext cx="1905238" cy="1905238"/>
           </a:xfrm>
           <a:prstGeom prst="rect">
             <a:avLst/>
           </a:prstGeom>
-          <a:noFill/>
-          <a:extLst>
-            <a:ext uri="{909E8E84-426E-40DD-AFC4-6F175D3DCCD1}">
-              <a14:hiddenFill xmlns:a14="http://schemas.microsoft.com/office/drawing/2010/main">
-                <a:solidFill>
-                  <a:srgbClr val="FFFFFF"/>
-                </a:solidFill>
-              </a14:hiddenFill>
-            </a:ext>
-          </a:extLst>
         </p:spPr>
       </p:pic>
+      <p:sp>
+        <p:nvSpPr>
+          <p:cNvPr id="2" name="Title 1" descr=" 2"/>
+          <p:cNvSpPr>
+            <a:spLocks noGrp="1"/>
+          </p:cNvSpPr>
+          <p:nvPr>
+            <p:ph type="title"/>
+          </p:nvPr>
+        </p:nvSpPr>
+        <p:spPr/>
+        <p:txBody>
+          <a:bodyPr/>
+          <a:lstStyle/>
+          <a:p>
+            <a:pPr algn="l"/>
+            <a:r>
+              <a:rPr lang="en-US" dirty="0"/>
+              <a:t>Extensions</a:t>
+            </a:r>
+          </a:p>
+        </p:txBody>
+      </p:sp>
       <p:sp>
         <p:nvSpPr>
           <p:cNvPr id="4" name="TextBox 3" descr=" 6"/>
@@ -8693,7 +8806,7 @@
         <p:spPr>
           <a:xfrm>
             <a:off x="3200400" y="1885712"/>
-            <a:ext cx="2730235" cy="1415772"/>
+            <a:ext cx="4516429" cy="954107"/>
           </a:xfrm>
           <a:prstGeom prst="rect">
             <a:avLst/>
@@ -8708,46 +8821,12 @@
           <a:p>
             <a:r>
               <a:rPr lang="en-US" sz="4000" dirty="0" smtClean="0"/>
-              <a:t>user scripts</a:t>
-            </a:r>
-          </a:p>
-          <a:p>
-            <a:r>
-              <a:rPr lang="en-US" sz="1400" dirty="0" smtClean="0">
-                <a:solidFill>
-                  <a:srgbClr val="A7A7A7"/>
-                </a:solidFill>
-                <a:latin typeface="FontAwesome" pitchFamily="2" charset="0"/>
-              </a:rPr>
-              <a:t> </a:t>
-            </a:r>
-            <a:r>
-              <a:rPr lang="en-US" sz="1400" dirty="0" smtClean="0">
-                <a:latin typeface="Segoe UI Light" pitchFamily="34" charset="0"/>
-              </a:rPr>
-              <a:t>userscripts.org</a:t>
-            </a:r>
-          </a:p>
-          <a:p>
-            <a:r>
-              <a:rPr lang="en-US" sz="1600" dirty="0">
-                <a:solidFill>
-                  <a:srgbClr val="A7A7A7"/>
-                </a:solidFill>
-                <a:latin typeface="FontAwesome" pitchFamily="2" charset="0"/>
-              </a:rPr>
-              <a:t> </a:t>
-            </a:r>
+              <a:t>browser extensions</a:t>
+            </a:r>
+          </a:p>
+          <a:p>
             <a:r>
               <a:rPr lang="en-US" sz="1600" dirty="0" smtClean="0">
-                <a:latin typeface="Segoe UI Light" pitchFamily="34" charset="0"/>
-              </a:rPr>
-              <a:t>greasespot.net</a:t>
-            </a:r>
-          </a:p>
-          <a:p>
-            <a:r>
-              <a:rPr lang="en-US" sz="1600" dirty="0">
                 <a:solidFill>
                   <a:srgbClr val="A7A7A7"/>
                 </a:solidFill>
@@ -8756,22 +8835,28 @@
               <a:t></a:t>
             </a:r>
             <a:r>
-              <a:rPr lang="en-US" sz="1600" dirty="0">
+              <a:rPr lang="en-US" sz="1600" dirty="0" smtClean="0">
                 <a:latin typeface="FontAwesome" pitchFamily="2" charset="0"/>
               </a:rPr>
               <a:t> </a:t>
             </a:r>
             <a:r>
-              <a:rPr lang="en-US" sz="1400" dirty="0" smtClean="0">
+              <a:rPr lang="en-US" sz="1400" dirty="0" err="1">
                 <a:latin typeface="Segoe UI Light" pitchFamily="34" charset="0"/>
               </a:rPr>
-              <a:t>nikmd23/</a:t>
-            </a:r>
-            <a:r>
-              <a:rPr lang="en-US" sz="1400" dirty="0" err="1" smtClean="0">
+              <a:t>phillip-haydon</a:t>
+            </a:r>
+            <a:r>
+              <a:rPr lang="en-US" sz="1400" dirty="0">
                 <a:latin typeface="Segoe UI Light" pitchFamily="34" charset="0"/>
               </a:rPr>
-              <a:t>voterScript</a:t>
+              <a:t>/</a:t>
+            </a:r>
+            <a:r>
+              <a:rPr lang="en-US" sz="1400" dirty="0" err="1">
+                <a:latin typeface="Segoe UI Light" pitchFamily="34" charset="0"/>
+              </a:rPr>
+              <a:t>github.expandinizr</a:t>
             </a:r>
             <a:endParaRPr lang="en-US" sz="1400" dirty="0">
               <a:latin typeface="Segoe UI Light" pitchFamily="34" charset="0"/>
@@ -8782,7 +8867,7 @@
     </p:spTree>
     <p:extLst>
       <p:ext uri="{BB962C8B-B14F-4D97-AF65-F5344CB8AC3E}">
-        <p14:creationId xmlns:p14="http://schemas.microsoft.com/office/powerpoint/2010/main" val="1559328820"/>
+        <p14:creationId xmlns:p14="http://schemas.microsoft.com/office/powerpoint/2010/main" val="826445166"/>
       </p:ext>
     </p:extLst>
   </p:cSld>
@@ -8845,17 +8930,152 @@
           <a:p>
             <a:pPr algn="l"/>
             <a:r>
-              <a:rPr lang="en-US" dirty="0" smtClean="0"/>
-              <a:t>WebHooks</a:t>
-            </a:r>
-            <a:endParaRPr lang="en-US" dirty="0"/>
+              <a:rPr lang="en-US" dirty="0"/>
+              <a:t>Extensions</a:t>
+            </a:r>
+          </a:p>
+        </p:txBody>
+      </p:sp>
+      <p:pic>
+        <p:nvPicPr>
+          <p:cNvPr id="3" name="Picture 2" descr=" 1026"/>
+          <p:cNvPicPr>
+            <a:picLocks noChangeAspect="1" noChangeArrowheads="1"/>
+          </p:cNvPicPr>
+          <p:nvPr/>
+        </p:nvPicPr>
+        <p:blipFill>
+          <a:blip r:embed="rId3" cstate="print">
+            <a:extLst>
+              <a:ext uri="{28A0092B-C50C-407E-A947-70E740481C1C}">
+                <a14:useLocalDpi xmlns:a14="http://schemas.microsoft.com/office/drawing/2010/main" val="0"/>
+              </a:ext>
+            </a:extLst>
+          </a:blip>
+          <a:srcRect/>
+          <a:stretch>
+            <a:fillRect/>
+          </a:stretch>
+        </p:blipFill>
+        <p:spPr bwMode="auto">
+          <a:xfrm>
+            <a:off x="1371362" y="1809750"/>
+            <a:ext cx="1600438" cy="1600438"/>
+          </a:xfrm>
+          <a:prstGeom prst="rect">
+            <a:avLst/>
+          </a:prstGeom>
+          <a:noFill/>
+          <a:extLst>
+            <a:ext uri="{909E8E84-426E-40DD-AFC4-6F175D3DCCD1}">
+              <a14:hiddenFill xmlns:a14="http://schemas.microsoft.com/office/drawing/2010/main">
+                <a:solidFill>
+                  <a:srgbClr val="FFFFFF"/>
+                </a:solidFill>
+              </a14:hiddenFill>
+            </a:ext>
+          </a:extLst>
+        </p:spPr>
+      </p:pic>
+      <p:sp>
+        <p:nvSpPr>
+          <p:cNvPr id="4" name="TextBox 3" descr=" 6"/>
+          <p:cNvSpPr txBox="1"/>
+          <p:nvPr/>
+        </p:nvSpPr>
+        <p:spPr>
+          <a:xfrm>
+            <a:off x="3200400" y="1885712"/>
+            <a:ext cx="2730235" cy="1415772"/>
+          </a:xfrm>
+          <a:prstGeom prst="rect">
+            <a:avLst/>
+          </a:prstGeom>
+          <a:noFill/>
+        </p:spPr>
+        <p:txBody>
+          <a:bodyPr wrap="none" rtlCol="0">
+            <a:spAutoFit/>
+          </a:bodyPr>
+          <a:lstStyle/>
+          <a:p>
+            <a:r>
+              <a:rPr lang="en-US" sz="4000" dirty="0" smtClean="0"/>
+              <a:t>user scripts</a:t>
+            </a:r>
+          </a:p>
+          <a:p>
+            <a:r>
+              <a:rPr lang="en-US" sz="1400" dirty="0" smtClean="0">
+                <a:solidFill>
+                  <a:srgbClr val="A7A7A7"/>
+                </a:solidFill>
+                <a:latin typeface="FontAwesome" pitchFamily="2" charset="0"/>
+              </a:rPr>
+              <a:t> </a:t>
+            </a:r>
+            <a:r>
+              <a:rPr lang="en-US" sz="1400" dirty="0" smtClean="0">
+                <a:latin typeface="Segoe UI Light" pitchFamily="34" charset="0"/>
+              </a:rPr>
+              <a:t>userscripts.org</a:t>
+            </a:r>
+          </a:p>
+          <a:p>
+            <a:r>
+              <a:rPr lang="en-US" sz="1600" dirty="0">
+                <a:solidFill>
+                  <a:srgbClr val="A7A7A7"/>
+                </a:solidFill>
+                <a:latin typeface="FontAwesome" pitchFamily="2" charset="0"/>
+              </a:rPr>
+              <a:t> </a:t>
+            </a:r>
+            <a:r>
+              <a:rPr lang="en-US" sz="1600" dirty="0" smtClean="0">
+                <a:latin typeface="Segoe UI Light" pitchFamily="34" charset="0"/>
+              </a:rPr>
+              <a:t>greasespot.net</a:t>
+            </a:r>
+          </a:p>
+          <a:p>
+            <a:r>
+              <a:rPr lang="en-US" sz="1600" dirty="0">
+                <a:solidFill>
+                  <a:srgbClr val="A7A7A7"/>
+                </a:solidFill>
+                <a:latin typeface="FontAwesome" pitchFamily="2" charset="0"/>
+              </a:rPr>
+              <a:t></a:t>
+            </a:r>
+            <a:r>
+              <a:rPr lang="en-US" sz="1600" dirty="0">
+                <a:latin typeface="FontAwesome" pitchFamily="2" charset="0"/>
+              </a:rPr>
+              <a:t> </a:t>
+            </a:r>
+            <a:r>
+              <a:rPr lang="en-US" sz="1400" dirty="0" smtClean="0">
+                <a:latin typeface="Segoe UI Light" pitchFamily="34" charset="0"/>
+              </a:rPr>
+              <a:t>nikmd23/</a:t>
+            </a:r>
+            <a:r>
+              <a:rPr lang="en-US" sz="1400" dirty="0" err="1" smtClean="0">
+                <a:latin typeface="Segoe UI Light" pitchFamily="34" charset="0"/>
+              </a:rPr>
+              <a:t>voterScript</a:t>
+            </a:r>
+            <a:endParaRPr lang="en-US" sz="1400" dirty="0">
+              <a:latin typeface="Segoe UI Light" pitchFamily="34" charset="0"/>
+            </a:endParaRPr>
           </a:p>
         </p:txBody>
       </p:sp>
     </p:spTree>
     <p:extLst>
       <p:ext uri="{BB962C8B-B14F-4D97-AF65-F5344CB8AC3E}">
-        <p14:creationId xmlns:p14="http://schemas.microsoft.com/office/powerpoint/2010/main" val="1274425667"/>
+        <p14:creationId xmlns:p14="http://schemas.microsoft.com/office/powerpoint/2010/main" val="1559328820"/>
       </p:ext>
     </p:extLst>
   </p:cSld>
@@ -8925,100 +9145,10 @@
           </a:p>
         </p:txBody>
       </p:sp>
-      <p:pic>
-        <p:nvPicPr>
-          <p:cNvPr id="3" name="Picture 3" descr=" 6147"/>
-          <p:cNvPicPr>
-            <a:picLocks noChangeAspect="1" noChangeArrowheads="1"/>
-          </p:cNvPicPr>
-          <p:nvPr/>
-        </p:nvPicPr>
-        <p:blipFill>
-          <a:blip r:embed="rId3" cstate="print">
-            <a:extLst>
-              <a:ext uri="{28A0092B-C50C-407E-A947-70E740481C1C}">
-                <a14:useLocalDpi xmlns:a14="http://schemas.microsoft.com/office/drawing/2010/main" val="0"/>
-              </a:ext>
-            </a:extLst>
-          </a:blip>
-          <a:srcRect/>
-          <a:stretch>
-            <a:fillRect/>
-          </a:stretch>
-        </p:blipFill>
-        <p:spPr bwMode="auto">
-          <a:xfrm>
-            <a:off x="1217203" y="1885712"/>
-            <a:ext cx="1789930" cy="1600438"/>
-          </a:xfrm>
-          <a:prstGeom prst="rect">
-            <a:avLst/>
-          </a:prstGeom>
-          <a:noFill/>
-          <a:extLst>
-            <a:ext uri="{909E8E84-426E-40DD-AFC4-6F175D3DCCD1}">
-              <a14:hiddenFill xmlns:a14="http://schemas.microsoft.com/office/drawing/2010/main">
-                <a:solidFill>
-                  <a:srgbClr val="FFFFFF"/>
-                </a:solidFill>
-              </a14:hiddenFill>
-            </a:ext>
-          </a:extLst>
-        </p:spPr>
-      </p:pic>
-      <p:sp>
-        <p:nvSpPr>
-          <p:cNvPr id="4" name="TextBox 3" descr=" 7"/>
-          <p:cNvSpPr txBox="1"/>
-          <p:nvPr/>
-        </p:nvSpPr>
-        <p:spPr>
-          <a:xfrm>
-            <a:off x="3200400" y="1885712"/>
-            <a:ext cx="2628348" cy="1169551"/>
-          </a:xfrm>
-          <a:prstGeom prst="rect">
-            <a:avLst/>
-          </a:prstGeom>
-          <a:noFill/>
-        </p:spPr>
-        <p:txBody>
-          <a:bodyPr wrap="none" rtlCol="0">
-            <a:spAutoFit/>
-          </a:bodyPr>
-          <a:lstStyle/>
-          <a:p>
-            <a:r>
-              <a:rPr lang="en-US" sz="4000" dirty="0" smtClean="0"/>
-              <a:t>web hooks</a:t>
-            </a:r>
-          </a:p>
-          <a:p>
-            <a:r>
-              <a:rPr lang="en-US" sz="1400" dirty="0" smtClean="0">
-                <a:solidFill>
-                  <a:srgbClr val="A7A7A7"/>
-                </a:solidFill>
-                <a:latin typeface="FontAwesome" pitchFamily="2" charset="0"/>
-              </a:rPr>
-              <a:t> </a:t>
-            </a:r>
-            <a:r>
-              <a:rPr lang="en-US" sz="1400" dirty="0" smtClean="0">
-                <a:latin typeface="Segoe UI Light" pitchFamily="34" charset="0"/>
-              </a:rPr>
-              <a:t>webhooks.org</a:t>
-            </a:r>
-          </a:p>
-          <a:p>
-            <a:endParaRPr lang="en-US" sz="1600" dirty="0"/>
-          </a:p>
-        </p:txBody>
-      </p:sp>
     </p:spTree>
     <p:extLst>
       <p:ext uri="{BB962C8B-B14F-4D97-AF65-F5344CB8AC3E}">
-        <p14:creationId xmlns:p14="http://schemas.microsoft.com/office/powerpoint/2010/main" val="388494153"/>
+        <p14:creationId xmlns:p14="http://schemas.microsoft.com/office/powerpoint/2010/main" val="1274425667"/>
       </p:ext>
     </p:extLst>
   </p:cSld>
@@ -9082,6 +9212,169 @@
             <a:pPr algn="l"/>
             <a:r>
               <a:rPr lang="en-US" dirty="0" smtClean="0"/>
+              <a:t>WebHooks</a:t>
+            </a:r>
+            <a:endParaRPr lang="en-US" dirty="0"/>
+          </a:p>
+        </p:txBody>
+      </p:sp>
+      <p:pic>
+        <p:nvPicPr>
+          <p:cNvPr id="3" name="Picture 3" descr=" 6147"/>
+          <p:cNvPicPr>
+            <a:picLocks noChangeAspect="1" noChangeArrowheads="1"/>
+          </p:cNvPicPr>
+          <p:nvPr/>
+        </p:nvPicPr>
+        <p:blipFill>
+          <a:blip r:embed="rId3" cstate="print">
+            <a:extLst>
+              <a:ext uri="{28A0092B-C50C-407E-A947-70E740481C1C}">
+                <a14:useLocalDpi xmlns:a14="http://schemas.microsoft.com/office/drawing/2010/main" val="0"/>
+              </a:ext>
+            </a:extLst>
+          </a:blip>
+          <a:srcRect/>
+          <a:stretch>
+            <a:fillRect/>
+          </a:stretch>
+        </p:blipFill>
+        <p:spPr bwMode="auto">
+          <a:xfrm>
+            <a:off x="1217203" y="1885712"/>
+            <a:ext cx="1789930" cy="1600438"/>
+          </a:xfrm>
+          <a:prstGeom prst="rect">
+            <a:avLst/>
+          </a:prstGeom>
+          <a:noFill/>
+          <a:extLst>
+            <a:ext uri="{909E8E84-426E-40DD-AFC4-6F175D3DCCD1}">
+              <a14:hiddenFill xmlns:a14="http://schemas.microsoft.com/office/drawing/2010/main">
+                <a:solidFill>
+                  <a:srgbClr val="FFFFFF"/>
+                </a:solidFill>
+              </a14:hiddenFill>
+            </a:ext>
+          </a:extLst>
+        </p:spPr>
+      </p:pic>
+      <p:sp>
+        <p:nvSpPr>
+          <p:cNvPr id="4" name="TextBox 3" descr=" 7"/>
+          <p:cNvSpPr txBox="1"/>
+          <p:nvPr/>
+        </p:nvSpPr>
+        <p:spPr>
+          <a:xfrm>
+            <a:off x="3200400" y="1885712"/>
+            <a:ext cx="2628348" cy="1169551"/>
+          </a:xfrm>
+          <a:prstGeom prst="rect">
+            <a:avLst/>
+          </a:prstGeom>
+          <a:noFill/>
+        </p:spPr>
+        <p:txBody>
+          <a:bodyPr wrap="none" rtlCol="0">
+            <a:spAutoFit/>
+          </a:bodyPr>
+          <a:lstStyle/>
+          <a:p>
+            <a:r>
+              <a:rPr lang="en-US" sz="4000" dirty="0" smtClean="0"/>
+              <a:t>web hooks</a:t>
+            </a:r>
+          </a:p>
+          <a:p>
+            <a:r>
+              <a:rPr lang="en-US" sz="1400" dirty="0" smtClean="0">
+                <a:solidFill>
+                  <a:srgbClr val="A7A7A7"/>
+                </a:solidFill>
+                <a:latin typeface="FontAwesome" pitchFamily="2" charset="0"/>
+              </a:rPr>
+              <a:t> </a:t>
+            </a:r>
+            <a:r>
+              <a:rPr lang="en-US" sz="1400" dirty="0" smtClean="0">
+                <a:latin typeface="Segoe UI Light" pitchFamily="34" charset="0"/>
+              </a:rPr>
+              <a:t>webhooks.org</a:t>
+            </a:r>
+          </a:p>
+          <a:p>
+            <a:endParaRPr lang="en-US" sz="1600" dirty="0"/>
+          </a:p>
+        </p:txBody>
+      </p:sp>
+    </p:spTree>
+    <p:extLst>
+      <p:ext uri="{BB962C8B-B14F-4D97-AF65-F5344CB8AC3E}">
+        <p14:creationId xmlns:p14="http://schemas.microsoft.com/office/powerpoint/2010/main" val="388494153"/>
+      </p:ext>
+    </p:extLst>
+  </p:cSld>
+  <p:clrMapOvr>
+    <a:masterClrMapping/>
+  </p:clrMapOvr>
+  <mc:AlternateContent xmlns:mc="http://schemas.openxmlformats.org/markup-compatibility/2006" xmlns:p14="http://schemas.microsoft.com/office/powerpoint/2010/main">
+    <mc:Choice Requires="p14">
+      <p:transition spd="slow" p14:dur="1500">
+        <p:cut/>
+      </p:transition>
+    </mc:Choice>
+    <mc:Fallback xmlns="">
+      <p:transition spd="slow">
+        <p:cut/>
+      </p:transition>
+    </mc:Fallback>
+  </mc:AlternateContent>
+  <p:timing>
+    <p:tnLst>
+      <p:par>
+        <p:cTn id="1" dur="indefinite" restart="never" nodeType="tmRoot"/>
+      </p:par>
+    </p:tnLst>
+  </p:timing>
+</p:sld>
+</file>
+
+<file path=ppt/slides/slide24.xml><?xml version="1.0" encoding="utf-8"?>
+<p:sld xmlns:a="http://schemas.openxmlformats.org/drawingml/2006/main" xmlns:r="http://schemas.openxmlformats.org/officeDocument/2006/relationships" xmlns:p="http://schemas.openxmlformats.org/presentationml/2006/main">
+  <p:cSld>
+    <p:spTree>
+      <p:nvGrpSpPr>
+        <p:cNvPr id="1" name=""/>
+        <p:cNvGrpSpPr/>
+        <p:nvPr/>
+      </p:nvGrpSpPr>
+      <p:grpSpPr>
+        <a:xfrm>
+          <a:off x="0" y="0"/>
+          <a:ext cx="0" cy="0"/>
+          <a:chOff x="0" y="0"/>
+          <a:chExt cx="0" cy="0"/>
+        </a:xfrm>
+      </p:grpSpPr>
+      <p:sp>
+        <p:nvSpPr>
+          <p:cNvPr id="2" name="Title 1" descr=" 2"/>
+          <p:cNvSpPr>
+            <a:spLocks noGrp="1"/>
+          </p:cNvSpPr>
+          <p:nvPr>
+            <p:ph type="title"/>
+          </p:nvPr>
+        </p:nvSpPr>
+        <p:spPr/>
+        <p:txBody>
+          <a:bodyPr/>
+          <a:lstStyle/>
+          <a:p>
+            <a:pPr algn="l"/>
+            <a:r>
+              <a:rPr lang="en-US" dirty="0" smtClean="0"/>
               <a:t>API</a:t>
             </a:r>
             <a:endParaRPr lang="en-US" dirty="0"/>
@@ -9120,7 +9413,7 @@
 </p:sld>
 </file>
 
-<file path=ppt/slides/slide24.xml><?xml version="1.0" encoding="utf-8"?>
+<file path=ppt/slides/slide25.xml><?xml version="1.0" encoding="utf-8"?>
 <p:sld xmlns:a="http://schemas.openxmlformats.org/drawingml/2006/main" xmlns:r="http://schemas.openxmlformats.org/officeDocument/2006/relationships" xmlns:p="http://schemas.openxmlformats.org/presentationml/2006/main">
   <p:cSld>
     <p:spTree>
@@ -9282,7 +9575,7 @@
 </p:sld>
 </file>
 
-<file path=ppt/slides/slide25.xml><?xml version="1.0" encoding="utf-8"?>
+<file path=ppt/slides/slide26.xml><?xml version="1.0" encoding="utf-8"?>
 <p:sld xmlns:a="http://schemas.openxmlformats.org/drawingml/2006/main" xmlns:r="http://schemas.openxmlformats.org/officeDocument/2006/relationships" xmlns:p="http://schemas.openxmlformats.org/presentationml/2006/main">
   <p:cSld>
     <p:spTree>
@@ -9458,7 +9751,7 @@
 </p:sld>
 </file>
 
-<file path=ppt/slides/slide26.xml><?xml version="1.0" encoding="utf-8"?>
+<file path=ppt/slides/slide27.xml><?xml version="1.0" encoding="utf-8"?>
 <p:sld xmlns:a="http://schemas.openxmlformats.org/drawingml/2006/main" xmlns:r="http://schemas.openxmlformats.org/officeDocument/2006/relationships" xmlns:p="http://schemas.openxmlformats.org/presentationml/2006/main">
   <p:cSld>
     <p:spTree>
@@ -9536,7 +9829,7 @@
 </p:sld>
 </file>
 
-<file path=ppt/slides/slide27.xml><?xml version="1.0" encoding="utf-8"?>
+<file path=ppt/slides/slide28.xml><?xml version="1.0" encoding="utf-8"?>
 <p:sld xmlns:a="http://schemas.openxmlformats.org/drawingml/2006/main" xmlns:r="http://schemas.openxmlformats.org/officeDocument/2006/relationships" xmlns:p="http://schemas.openxmlformats.org/presentationml/2006/main">
   <p:cSld>
     <p:spTree>
@@ -9655,7 +9948,7 @@
 </p:sld>
 </file>
 
-<file path=ppt/slides/slide28.xml><?xml version="1.0" encoding="utf-8"?>
+<file path=ppt/slides/slide29.xml><?xml version="1.0" encoding="utf-8"?>
 <p:sld xmlns:a="http://schemas.openxmlformats.org/drawingml/2006/main" xmlns:r="http://schemas.openxmlformats.org/officeDocument/2006/relationships" xmlns:p="http://schemas.openxmlformats.org/presentationml/2006/main">
   <p:cSld>
     <p:spTree>

</xml_diff>